<commit_message>
small updates to syllabus
</commit_message>
<xml_diff>
--- a/Week 1 -- Likelihoods and linear models/Lecture 1/Lecture 1 -- Linear models.pptx
+++ b/Week 1 -- Likelihoods and linear models/Lecture 1/Lecture 1 -- Linear models.pptx
@@ -221,7 +221,7 @@
           <a:p>
             <a:fld id="{1522831B-4FE3-4D45-950B-0D2C6BB2DD76}" type="datetimeFigureOut">
               <a:rPr lang="en-US" smtClean="0"/>
-              <a:t>3/3/2016</a:t>
+              <a:t>3/29/2016</a:t>
             </a:fld>
             <a:endParaRPr lang="en-US"/>
           </a:p>
@@ -3481,7 +3481,15 @@
           <a:p>
             <a:r>
               <a:rPr lang="en-US" dirty="0" smtClean="0"/>
-              <a:t>March 29, 2015</a:t>
+              <a:t>March 29</a:t>
+            </a:r>
+            <a:r>
+              <a:rPr lang="en-US" smtClean="0"/>
+              <a:t>, </a:t>
+            </a:r>
+            <a:r>
+              <a:rPr lang="en-US" smtClean="0"/>
+              <a:t>2016</a:t>
             </a:r>
             <a:endParaRPr lang="en-US" dirty="0"/>
           </a:p>
@@ -9267,7 +9275,7 @@
           <a:graphicData uri="http://schemas.openxmlformats.org/presentationml/2006/ole">
             <mc:AlternateContent xmlns:mc="http://schemas.openxmlformats.org/markup-compatibility/2006">
               <mc:Choice xmlns:v="urn:schemas-microsoft-com:vml" Requires="v">
-                <p:oleObj spid="_x0000_s3133" name="Equation" r:id="rId4" imgW="914400" imgH="291960" progId="Equation.DSMT4">
+                <p:oleObj spid="_x0000_s3134" name="Equation" r:id="rId4" imgW="914400" imgH="291960" progId="Equation.DSMT4">
                   <p:embed/>
                 </p:oleObj>
               </mc:Choice>
@@ -12548,8 +12556,8 @@
           </a:p>
         </p:txBody>
       </p:sp>
-      <mc:AlternateContent xmlns:mc="http://schemas.openxmlformats.org/markup-compatibility/2006">
-        <mc:Choice xmlns:a14="http://schemas.microsoft.com/office/drawing/2010/main" Requires="a14">
+      <mc:AlternateContent xmlns:mc="http://schemas.openxmlformats.org/markup-compatibility/2006" xmlns:a14="http://schemas.microsoft.com/office/drawing/2010/main">
+        <mc:Choice Requires="a14">
           <p:sp>
             <p:nvSpPr>
               <p:cNvPr id="3" name="Content Placeholder 2"/>
@@ -13211,7 +13219,7 @@
             </p:txBody>
           </p:sp>
         </mc:Choice>
-        <mc:Fallback>
+        <mc:Fallback xmlns="">
           <p:sp>
             <p:nvSpPr>
               <p:cNvPr id="3" name="Content Placeholder 2"/>

</xml_diff>

<commit_message>
added PPT for lecture 1
</commit_message>
<xml_diff>
--- a/Week 1 -- Likelihoods and linear models/Lecture 1/Lecture 1 -- Linear models.pptx
+++ b/Week 1 -- Likelihoods and linear models/Lecture 1/Lecture 1 -- Linear models.pptx
@@ -35,7 +35,7 @@
     <p:sldId id="294" r:id="rId26"/>
   </p:sldIdLst>
   <p:sldSz cx="9144000" cy="6858000" type="screen4x3"/>
-  <p:notesSz cx="6858000" cy="9144000"/>
+  <p:notesSz cx="7315200" cy="9601200"/>
   <p:defaultTextStyle>
     <a:defPPr>
       <a:defRPr lang="en-US"/>
@@ -174,17 +174,17 @@
         <p:spPr>
           <a:xfrm>
             <a:off x="0" y="0"/>
-            <a:ext cx="2971800" cy="458788"/>
+            <a:ext cx="3169920" cy="481727"/>
           </a:xfrm>
           <a:prstGeom prst="rect">
             <a:avLst/>
           </a:prstGeom>
         </p:spPr>
         <p:txBody>
-          <a:bodyPr vert="horz" lIns="91440" tIns="45720" rIns="91440" bIns="45720" rtlCol="0"/>
+          <a:bodyPr vert="horz" lIns="96661" tIns="48331" rIns="96661" bIns="48331" rtlCol="0"/>
           <a:lstStyle>
             <a:lvl1pPr algn="l">
-              <a:defRPr sz="1200"/>
+              <a:defRPr sz="1300"/>
             </a:lvl1pPr>
           </a:lstStyle>
           <a:p>
@@ -204,18 +204,18 @@
         </p:nvSpPr>
         <p:spPr>
           <a:xfrm>
-            <a:off x="3884613" y="0"/>
-            <a:ext cx="2971800" cy="458788"/>
+            <a:off x="4143587" y="0"/>
+            <a:ext cx="3169920" cy="481727"/>
           </a:xfrm>
           <a:prstGeom prst="rect">
             <a:avLst/>
           </a:prstGeom>
         </p:spPr>
         <p:txBody>
-          <a:bodyPr vert="horz" lIns="91440" tIns="45720" rIns="91440" bIns="45720" rtlCol="0"/>
+          <a:bodyPr vert="horz" lIns="96661" tIns="48331" rIns="96661" bIns="48331" rtlCol="0"/>
           <a:lstStyle>
             <a:lvl1pPr algn="r">
-              <a:defRPr sz="1200"/>
+              <a:defRPr sz="1300"/>
             </a:lvl1pPr>
           </a:lstStyle>
           <a:p>
@@ -239,8 +239,8 @@
         </p:nvSpPr>
         <p:spPr>
           <a:xfrm>
-            <a:off x="1371600" y="1143000"/>
-            <a:ext cx="4114800" cy="3086100"/>
+            <a:off x="1497013" y="1200150"/>
+            <a:ext cx="4321175" cy="3240088"/>
           </a:xfrm>
           <a:prstGeom prst="rect">
             <a:avLst/>
@@ -253,7 +253,7 @@
           </a:ln>
         </p:spPr>
         <p:txBody>
-          <a:bodyPr vert="horz" lIns="91440" tIns="45720" rIns="91440" bIns="45720" rtlCol="0" anchor="ctr"/>
+          <a:bodyPr vert="horz" lIns="96661" tIns="48331" rIns="96661" bIns="48331" rtlCol="0" anchor="ctr"/>
           <a:lstStyle/>
           <a:p>
             <a:endParaRPr lang="en-US"/>
@@ -272,15 +272,15 @@
         </p:nvSpPr>
         <p:spPr>
           <a:xfrm>
-            <a:off x="685800" y="4400550"/>
-            <a:ext cx="5486400" cy="3600450"/>
+            <a:off x="731520" y="4620577"/>
+            <a:ext cx="5852160" cy="3780473"/>
           </a:xfrm>
           <a:prstGeom prst="rect">
             <a:avLst/>
           </a:prstGeom>
         </p:spPr>
         <p:txBody>
-          <a:bodyPr vert="horz" lIns="91440" tIns="45720" rIns="91440" bIns="45720" rtlCol="0"/>
+          <a:bodyPr vert="horz" lIns="96661" tIns="48331" rIns="96661" bIns="48331" rtlCol="0"/>
           <a:lstStyle/>
           <a:p>
             <a:pPr lvl="0"/>
@@ -332,18 +332,18 @@
         </p:nvSpPr>
         <p:spPr>
           <a:xfrm>
-            <a:off x="0" y="8685213"/>
-            <a:ext cx="2971800" cy="458787"/>
+            <a:off x="0" y="9119474"/>
+            <a:ext cx="3169920" cy="481726"/>
           </a:xfrm>
           <a:prstGeom prst="rect">
             <a:avLst/>
           </a:prstGeom>
         </p:spPr>
         <p:txBody>
-          <a:bodyPr vert="horz" lIns="91440" tIns="45720" rIns="91440" bIns="45720" rtlCol="0" anchor="b"/>
+          <a:bodyPr vert="horz" lIns="96661" tIns="48331" rIns="96661" bIns="48331" rtlCol="0" anchor="b"/>
           <a:lstStyle>
             <a:lvl1pPr algn="l">
-              <a:defRPr sz="1200"/>
+              <a:defRPr sz="1300"/>
             </a:lvl1pPr>
           </a:lstStyle>
           <a:p>
@@ -363,18 +363,18 @@
         </p:nvSpPr>
         <p:spPr>
           <a:xfrm>
-            <a:off x="3884613" y="8685213"/>
-            <a:ext cx="2971800" cy="458787"/>
+            <a:off x="4143587" y="9119474"/>
+            <a:ext cx="3169920" cy="481726"/>
           </a:xfrm>
           <a:prstGeom prst="rect">
             <a:avLst/>
           </a:prstGeom>
         </p:spPr>
         <p:txBody>
-          <a:bodyPr vert="horz" lIns="91440" tIns="45720" rIns="91440" bIns="45720" rtlCol="0" anchor="b"/>
+          <a:bodyPr vert="horz" lIns="96661" tIns="48331" rIns="96661" bIns="48331" rtlCol="0" anchor="b"/>
           <a:lstStyle>
             <a:lvl1pPr algn="r">
-              <a:defRPr sz="1200"/>
+              <a:defRPr sz="1300"/>
             </a:lvl1pPr>
           </a:lstStyle>
           <a:p>
@@ -3485,11 +3485,7 @@
             </a:r>
             <a:r>
               <a:rPr lang="en-US" smtClean="0"/>
-              <a:t>, </a:t>
-            </a:r>
-            <a:r>
-              <a:rPr lang="en-US" smtClean="0"/>
-              <a:t>2016</a:t>
+              <a:t>, 2016</a:t>
             </a:r>
             <a:endParaRPr lang="en-US" dirty="0"/>
           </a:p>
@@ -9275,7 +9271,7 @@
           <a:graphicData uri="http://schemas.openxmlformats.org/presentationml/2006/ole">
             <mc:AlternateContent xmlns:mc="http://schemas.openxmlformats.org/markup-compatibility/2006">
               <mc:Choice xmlns:v="urn:schemas-microsoft-com:vml" Requires="v">
-                <p:oleObj spid="_x0000_s3134" name="Equation" r:id="rId4" imgW="914400" imgH="291960" progId="Equation.DSMT4">
+                <p:oleObj spid="_x0000_s3136" name="Equation" r:id="rId4" imgW="914400" imgH="291960" progId="Equation.DSMT4">
                   <p:embed/>
                 </p:oleObj>
               </mc:Choice>
@@ -12007,6 +12003,13 @@
   <p:clrMapOvr>
     <a:masterClrMapping/>
   </p:clrMapOvr>
+  <p:timing>
+    <p:tnLst>
+      <p:par>
+        <p:cTn id="1" dur="indefinite" restart="never" nodeType="tmRoot"/>
+      </p:par>
+    </p:tnLst>
+  </p:timing>
 </p:sld>
 </file>
 
@@ -12046,8 +12049,8 @@
           </a:p>
         </p:txBody>
       </p:sp>
-      <mc:AlternateContent xmlns:mc="http://schemas.openxmlformats.org/markup-compatibility/2006" xmlns:a14="http://schemas.microsoft.com/office/drawing/2010/main">
-        <mc:Choice Requires="a14">
+      <mc:AlternateContent xmlns:mc="http://schemas.openxmlformats.org/markup-compatibility/2006">
+        <mc:Choice xmlns:a14="http://schemas.microsoft.com/office/drawing/2010/main" Requires="a14">
           <p:sp>
             <p:nvSpPr>
               <p:cNvPr id="3" name="Content Placeholder 2"/>
@@ -12308,6 +12311,19 @@
                       <a:rPr lang="en-US" i="1" dirty="0">
                         <a:latin typeface="Cambria Math" panose="02040503050406030204" pitchFamily="18" charset="0"/>
                       </a:rPr>
+                      <m:t>𝑐</m:t>
+                    </m:r>
+                    <m:r>
+                      <a:rPr lang="en-US" i="1" dirty="0" smtClean="0">
+                        <a:latin typeface="Cambria Math" panose="02040503050406030204" pitchFamily="18" charset="0"/>
+                        <a:ea typeface="Cambria Math" panose="02040503050406030204" pitchFamily="18" charset="0"/>
+                      </a:rPr>
+                      <m:t>×</m:t>
+                    </m:r>
+                    <m:r>
+                      <a:rPr lang="en-US" i="1" dirty="0">
+                        <a:latin typeface="Cambria Math" panose="02040503050406030204" pitchFamily="18" charset="0"/>
+                      </a:rPr>
                       <m:t>𝐿</m:t>
                     </m:r>
                     <m:r>
@@ -12343,18 +12359,6 @@
                       </a:rPr>
                       <m:t>)</m:t>
                     </m:r>
-                    <m:r>
-                      <a:rPr lang="en-US" b="0" i="0" dirty="0" smtClean="0">
-                        <a:latin typeface="Cambria Math" panose="02040503050406030204" pitchFamily="18" charset="0"/>
-                      </a:rPr>
-                      <m:t>+</m:t>
-                    </m:r>
-                    <m:r>
-                      <a:rPr lang="en-US" b="0" i="1" dirty="0" smtClean="0">
-                        <a:latin typeface="Cambria Math" panose="02040503050406030204" pitchFamily="18" charset="0"/>
-                      </a:rPr>
-                      <m:t>𝑐</m:t>
-                    </m:r>
                   </m:oMath>
                 </a14:m>
                 <a:endParaRPr lang="en-US" i="1" dirty="0"/>
@@ -12374,7 +12378,7 @@
             </p:txBody>
           </p:sp>
         </mc:Choice>
-        <mc:Fallback xmlns="">
+        <mc:Fallback>
           <p:sp>
             <p:nvSpPr>
               <p:cNvPr id="3" name="Content Placeholder 2"/>
@@ -13838,8 +13842,8 @@
           </a:p>
         </p:txBody>
       </p:sp>
-      <mc:AlternateContent xmlns:mc="http://schemas.openxmlformats.org/markup-compatibility/2006" xmlns:a14="http://schemas.microsoft.com/office/drawing/2010/main">
-        <mc:Choice Requires="a14">
+      <mc:AlternateContent xmlns:mc="http://schemas.openxmlformats.org/markup-compatibility/2006">
+        <mc:Choice xmlns:a14="http://schemas.microsoft.com/office/drawing/2010/main" Requires="a14">
           <p:sp>
             <p:nvSpPr>
               <p:cNvPr id="3" name="Content Placeholder 2"/>
@@ -14254,45 +14258,74 @@
                     </m:oMathParaPr>
                     <m:oMath xmlns:m="http://schemas.openxmlformats.org/officeDocument/2006/math">
                       <m:r>
+                        <m:rPr>
+                          <m:sty m:val="p"/>
+                        </m:rPr>
+                        <a:rPr lang="en-US" b="0" i="0" smtClean="0">
+                          <a:latin typeface="Cambria Math" panose="02040503050406030204" pitchFamily="18" charset="0"/>
+                          <a:ea typeface="Cambria Math" panose="02040503050406030204" pitchFamily="18" charset="0"/>
+                        </a:rPr>
+                        <m:t>log</m:t>
+                      </m:r>
+                      <m:r>
+                        <a:rPr lang="en-US" b="0" i="1" smtClean="0">
+                          <a:latin typeface="Cambria Math" panose="02040503050406030204" pitchFamily="18" charset="0"/>
+                          <a:ea typeface="Cambria Math" panose="02040503050406030204" pitchFamily="18" charset="0"/>
+                        </a:rPr>
+                        <m:t>⁡(</m:t>
+                      </m:r>
+                      <m:r>
                         <a:rPr lang="en-US" i="1">
                           <a:latin typeface="Cambria Math" panose="02040503050406030204" pitchFamily="18" charset="0"/>
                           <a:ea typeface="Cambria Math" panose="02040503050406030204" pitchFamily="18" charset="0"/>
                         </a:rPr>
                         <m:t>𝐿</m:t>
                       </m:r>
-                      <m:r>
-                        <a:rPr lang="en-US" i="1">
-                          <a:latin typeface="Cambria Math" panose="02040503050406030204" pitchFamily="18" charset="0"/>
-                          <a:ea typeface="Cambria Math" panose="02040503050406030204" pitchFamily="18" charset="0"/>
-                        </a:rPr>
-                        <m:t>(</m:t>
-                      </m:r>
-                      <m:r>
-                        <a:rPr lang="en-US" b="1" i="0">
-                          <a:latin typeface="Cambria Math" panose="02040503050406030204" pitchFamily="18" charset="0"/>
-                          <a:ea typeface="Cambria Math" panose="02040503050406030204" pitchFamily="18" charset="0"/>
-                        </a:rPr>
-                        <m:t>𝛉</m:t>
-                      </m:r>
+                      <m:d>
+                        <m:dPr>
+                          <m:ctrlPr>
+                            <a:rPr lang="en-US" i="1">
+                              <a:latin typeface="Cambria Math" panose="02040503050406030204" pitchFamily="18" charset="0"/>
+                              <a:ea typeface="Cambria Math" panose="02040503050406030204" pitchFamily="18" charset="0"/>
+                            </a:rPr>
+                          </m:ctrlPr>
+                        </m:dPr>
+                        <m:e>
+                          <m:r>
+                            <a:rPr lang="en-US" b="1" i="0">
+                              <a:latin typeface="Cambria Math" panose="02040503050406030204" pitchFamily="18" charset="0"/>
+                              <a:ea typeface="Cambria Math" panose="02040503050406030204" pitchFamily="18" charset="0"/>
+                            </a:rPr>
+                            <m:t>𝛉</m:t>
+                          </m:r>
+                          <m:r>
+                            <a:rPr lang="en-US" b="0" i="1" smtClean="0">
+                              <a:latin typeface="Cambria Math" panose="02040503050406030204" pitchFamily="18" charset="0"/>
+                              <a:ea typeface="Cambria Math" panose="02040503050406030204" pitchFamily="18" charset="0"/>
+                            </a:rPr>
+                            <m:t>;</m:t>
+                          </m:r>
+                          <m:r>
+                            <a:rPr lang="en-US" b="1">
+                              <a:latin typeface="Cambria Math" panose="02040503050406030204" pitchFamily="18" charset="0"/>
+                            </a:rPr>
+                            <m:t>𝐲</m:t>
+                          </m:r>
+                        </m:e>
+                      </m:d>
                       <m:r>
                         <a:rPr lang="en-US" b="0" i="1" smtClean="0">
                           <a:latin typeface="Cambria Math" panose="02040503050406030204" pitchFamily="18" charset="0"/>
                           <a:ea typeface="Cambria Math" panose="02040503050406030204" pitchFamily="18" charset="0"/>
                         </a:rPr>
-                        <m:t>;</m:t>
-                      </m:r>
-                      <m:r>
-                        <a:rPr lang="en-US" b="1">
-                          <a:latin typeface="Cambria Math" panose="02040503050406030204" pitchFamily="18" charset="0"/>
-                        </a:rPr>
-                        <m:t>𝐲</m:t>
+                        <m:t>)</m:t>
                       </m:r>
                       <m:r>
                         <a:rPr lang="en-US" i="1">
                           <a:latin typeface="Cambria Math" panose="02040503050406030204" pitchFamily="18" charset="0"/>
                           <a:ea typeface="Cambria Math" panose="02040503050406030204" pitchFamily="18" charset="0"/>
                         </a:rPr>
-                        <m:t>)=</m:t>
+                        <m:t>=</m:t>
                       </m:r>
                       <m:nary>
                         <m:naryPr>
@@ -14355,63 +14388,85 @@
                         </m:sup>
                         <m:e>
                           <m:r>
+                            <m:rPr>
+                              <m:sty m:val="p"/>
+                            </m:rPr>
+                            <a:rPr lang="en-US" b="0" i="0" smtClean="0">
+                              <a:latin typeface="Cambria Math" panose="02040503050406030204" pitchFamily="18" charset="0"/>
+                              <a:ea typeface="Cambria Math" panose="02040503050406030204" pitchFamily="18" charset="0"/>
+                            </a:rPr>
+                            <m:t>log</m:t>
+                          </m:r>
+                          <m:r>
+                            <a:rPr lang="en-US" b="0" i="1" smtClean="0">
+                              <a:latin typeface="Cambria Math" panose="02040503050406030204" pitchFamily="18" charset="0"/>
+                              <a:ea typeface="Cambria Math" panose="02040503050406030204" pitchFamily="18" charset="0"/>
+                            </a:rPr>
+                            <m:t>⁡(</m:t>
+                          </m:r>
+                          <m:r>
                             <a:rPr lang="en-US" i="1">
                               <a:latin typeface="Cambria Math" panose="02040503050406030204" pitchFamily="18" charset="0"/>
                               <a:ea typeface="Cambria Math" panose="02040503050406030204" pitchFamily="18" charset="0"/>
                             </a:rPr>
                             <m:t>𝐿</m:t>
                           </m:r>
-                          <m:r>
-                            <a:rPr lang="en-US" i="1">
-                              <a:latin typeface="Cambria Math" panose="02040503050406030204" pitchFamily="18" charset="0"/>
-                              <a:ea typeface="Cambria Math" panose="02040503050406030204" pitchFamily="18" charset="0"/>
-                            </a:rPr>
-                            <m:t>(</m:t>
-                          </m:r>
-                          <m:r>
-                            <a:rPr lang="en-US" b="1">
-                              <a:latin typeface="Cambria Math" panose="02040503050406030204" pitchFamily="18" charset="0"/>
-                              <a:ea typeface="Cambria Math" panose="02040503050406030204" pitchFamily="18" charset="0"/>
-                            </a:rPr>
-                            <m:t>𝛉</m:t>
-                          </m:r>
-                          <m:r>
-                            <a:rPr lang="en-US" b="0" i="1" smtClean="0">
-                              <a:latin typeface="Cambria Math" panose="02040503050406030204" pitchFamily="18" charset="0"/>
-                              <a:ea typeface="Cambria Math" panose="02040503050406030204" pitchFamily="18" charset="0"/>
-                            </a:rPr>
-                            <m:t>;</m:t>
-                          </m:r>
-                          <m:sSub>
-                            <m:sSubPr>
+                          <m:d>
+                            <m:dPr>
                               <m:ctrlPr>
                                 <a:rPr lang="en-US" i="1">
                                   <a:latin typeface="Cambria Math" panose="02040503050406030204" pitchFamily="18" charset="0"/>
                                   <a:ea typeface="Cambria Math" panose="02040503050406030204" pitchFamily="18" charset="0"/>
                                 </a:rPr>
                               </m:ctrlPr>
-                            </m:sSubPr>
+                            </m:dPr>
                             <m:e>
+                              <m:r>
+                                <a:rPr lang="en-US" b="1">
+                                  <a:latin typeface="Cambria Math" panose="02040503050406030204" pitchFamily="18" charset="0"/>
+                                  <a:ea typeface="Cambria Math" panose="02040503050406030204" pitchFamily="18" charset="0"/>
+                                </a:rPr>
+                                <m:t>𝛉</m:t>
+                              </m:r>
                               <m:r>
                                 <a:rPr lang="en-US" b="0" i="1" smtClean="0">
                                   <a:latin typeface="Cambria Math" panose="02040503050406030204" pitchFamily="18" charset="0"/>
                                   <a:ea typeface="Cambria Math" panose="02040503050406030204" pitchFamily="18" charset="0"/>
                                 </a:rPr>
-                                <m:t>𝑦</m:t>
+                                <m:t>;</m:t>
                               </m:r>
+                              <m:sSub>
+                                <m:sSubPr>
+                                  <m:ctrlPr>
+                                    <a:rPr lang="en-US" i="1">
+                                      <a:latin typeface="Cambria Math" panose="02040503050406030204" pitchFamily="18" charset="0"/>
+                                      <a:ea typeface="Cambria Math" panose="02040503050406030204" pitchFamily="18" charset="0"/>
+                                    </a:rPr>
+                                  </m:ctrlPr>
+                                </m:sSubPr>
+                                <m:e>
+                                  <m:r>
+                                    <a:rPr lang="en-US" b="0" i="1" smtClean="0">
+                                      <a:latin typeface="Cambria Math" panose="02040503050406030204" pitchFamily="18" charset="0"/>
+                                      <a:ea typeface="Cambria Math" panose="02040503050406030204" pitchFamily="18" charset="0"/>
+                                    </a:rPr>
+                                    <m:t>𝑦</m:t>
+                                  </m:r>
+                                </m:e>
+                                <m:sub>
+                                  <m:r>
+                                    <a:rPr lang="en-US" i="1">
+                                      <a:latin typeface="Cambria Math" panose="02040503050406030204" pitchFamily="18" charset="0"/>
+                                      <a:ea typeface="Cambria Math" panose="02040503050406030204" pitchFamily="18" charset="0"/>
+                                    </a:rPr>
+                                    <m:t>𝑖</m:t>
+                                  </m:r>
+                                </m:sub>
+                              </m:sSub>
                             </m:e>
-                            <m:sub>
-                              <m:r>
-                                <a:rPr lang="en-US" i="1">
-                                  <a:latin typeface="Cambria Math" panose="02040503050406030204" pitchFamily="18" charset="0"/>
-                                  <a:ea typeface="Cambria Math" panose="02040503050406030204" pitchFamily="18" charset="0"/>
-                                </a:rPr>
-                                <m:t>𝑖</m:t>
-                              </m:r>
-                            </m:sub>
-                          </m:sSub>
+                          </m:d>
                           <m:r>
-                            <a:rPr lang="en-US" i="1">
+                            <a:rPr lang="en-US" b="0" i="1" smtClean="0">
                               <a:latin typeface="Cambria Math" panose="02040503050406030204" pitchFamily="18" charset="0"/>
                               <a:ea typeface="Cambria Math" panose="02040503050406030204" pitchFamily="18" charset="0"/>
                             </a:rPr>
@@ -14586,6 +14641,23 @@
                             </m:sup>
                             <m:e>
                               <m:r>
+                                <m:rPr>
+                                  <m:sty m:val="p"/>
+                                </m:rPr>
+                                <a:rPr lang="en-US" b="0" i="0" smtClean="0">
+                                  <a:latin typeface="Cambria Math" panose="02040503050406030204" pitchFamily="18" charset="0"/>
+                                  <a:ea typeface="Cambria Math" panose="02040503050406030204" pitchFamily="18" charset="0"/>
+                                </a:rPr>
+                                <m:t>log</m:t>
+                              </m:r>
+                              <m:r>
+                                <a:rPr lang="en-US" b="0" i="1" smtClean="0">
+                                  <a:latin typeface="Cambria Math" panose="02040503050406030204" pitchFamily="18" charset="0"/>
+                                  <a:ea typeface="Cambria Math" panose="02040503050406030204" pitchFamily="18" charset="0"/>
+                                </a:rPr>
+                                <m:t>⁡(</m:t>
+                              </m:r>
+                              <m:r>
                                 <a:rPr lang="en-US" i="1">
                                   <a:latin typeface="Cambria Math" panose="02040503050406030204" pitchFamily="18" charset="0"/>
                                   <a:ea typeface="Cambria Math" panose="02040503050406030204" pitchFamily="18" charset="0"/>
@@ -14648,6 +14720,13 @@
                                 </a:rPr>
                                 <m:t>)</m:t>
                               </m:r>
+                              <m:r>
+                                <a:rPr lang="en-US" b="0" i="1" smtClean="0">
+                                  <a:latin typeface="Cambria Math" panose="02040503050406030204" pitchFamily="18" charset="0"/>
+                                  <a:ea typeface="Cambria Math" panose="02040503050406030204" pitchFamily="18" charset="0"/>
+                                </a:rPr>
+                                <m:t>)</m:t>
+                              </m:r>
                             </m:e>
                           </m:nary>
                         </m:e>
@@ -14666,7 +14745,7 @@
             </p:txBody>
           </p:sp>
         </mc:Choice>
-        <mc:Fallback xmlns="">
+        <mc:Fallback>
           <p:sp>
             <p:nvSpPr>
               <p:cNvPr id="3" name="Content Placeholder 2"/>

</xml_diff>